<commit_message>
changed presentation slightly and gitignore
</commit_message>
<xml_diff>
--- a/individual_project_documentation/D&D INTERFACE.pptx
+++ b/individual_project_documentation/D&D INTERFACE.pptx
@@ -270,7 +270,7 @@
           <a:p>
             <a:fld id="{DBBD8385-818C-48A9-A8BE-462C76FE1CE1}" type="datetimeFigureOut">
               <a:rPr lang="en-GB" smtClean="0"/>
-              <a:t>19/11/2019</a:t>
+              <a:t>20/11/2019</a:t>
             </a:fld>
             <a:endParaRPr lang="en-GB"/>
           </a:p>
@@ -470,7 +470,7 @@
           <a:p>
             <a:fld id="{DBBD8385-818C-48A9-A8BE-462C76FE1CE1}" type="datetimeFigureOut">
               <a:rPr lang="en-GB" smtClean="0"/>
-              <a:t>19/11/2019</a:t>
+              <a:t>20/11/2019</a:t>
             </a:fld>
             <a:endParaRPr lang="en-GB"/>
           </a:p>
@@ -680,7 +680,7 @@
           <a:p>
             <a:fld id="{DBBD8385-818C-48A9-A8BE-462C76FE1CE1}" type="datetimeFigureOut">
               <a:rPr lang="en-GB" smtClean="0"/>
-              <a:t>19/11/2019</a:t>
+              <a:t>20/11/2019</a:t>
             </a:fld>
             <a:endParaRPr lang="en-GB"/>
           </a:p>
@@ -880,7 +880,7 @@
           <a:p>
             <a:fld id="{DBBD8385-818C-48A9-A8BE-462C76FE1CE1}" type="datetimeFigureOut">
               <a:rPr lang="en-GB" smtClean="0"/>
-              <a:t>19/11/2019</a:t>
+              <a:t>20/11/2019</a:t>
             </a:fld>
             <a:endParaRPr lang="en-GB"/>
           </a:p>
@@ -1156,7 +1156,7 @@
           <a:p>
             <a:fld id="{DBBD8385-818C-48A9-A8BE-462C76FE1CE1}" type="datetimeFigureOut">
               <a:rPr lang="en-GB" smtClean="0"/>
-              <a:t>19/11/2019</a:t>
+              <a:t>20/11/2019</a:t>
             </a:fld>
             <a:endParaRPr lang="en-GB"/>
           </a:p>
@@ -1424,7 +1424,7 @@
           <a:p>
             <a:fld id="{DBBD8385-818C-48A9-A8BE-462C76FE1CE1}" type="datetimeFigureOut">
               <a:rPr lang="en-GB" smtClean="0"/>
-              <a:t>19/11/2019</a:t>
+              <a:t>20/11/2019</a:t>
             </a:fld>
             <a:endParaRPr lang="en-GB"/>
           </a:p>
@@ -1839,7 +1839,7 @@
           <a:p>
             <a:fld id="{DBBD8385-818C-48A9-A8BE-462C76FE1CE1}" type="datetimeFigureOut">
               <a:rPr lang="en-GB" smtClean="0"/>
-              <a:t>19/11/2019</a:t>
+              <a:t>20/11/2019</a:t>
             </a:fld>
             <a:endParaRPr lang="en-GB"/>
           </a:p>
@@ -1981,7 +1981,7 @@
           <a:p>
             <a:fld id="{DBBD8385-818C-48A9-A8BE-462C76FE1CE1}" type="datetimeFigureOut">
               <a:rPr lang="en-GB" smtClean="0"/>
-              <a:t>19/11/2019</a:t>
+              <a:t>20/11/2019</a:t>
             </a:fld>
             <a:endParaRPr lang="en-GB"/>
           </a:p>
@@ -2094,7 +2094,7 @@
           <a:p>
             <a:fld id="{DBBD8385-818C-48A9-A8BE-462C76FE1CE1}" type="datetimeFigureOut">
               <a:rPr lang="en-GB" smtClean="0"/>
-              <a:t>19/11/2019</a:t>
+              <a:t>20/11/2019</a:t>
             </a:fld>
             <a:endParaRPr lang="en-GB"/>
           </a:p>
@@ -2407,7 +2407,7 @@
           <a:p>
             <a:fld id="{DBBD8385-818C-48A9-A8BE-462C76FE1CE1}" type="datetimeFigureOut">
               <a:rPr lang="en-GB" smtClean="0"/>
-              <a:t>19/11/2019</a:t>
+              <a:t>20/11/2019</a:t>
             </a:fld>
             <a:endParaRPr lang="en-GB"/>
           </a:p>
@@ -2696,7 +2696,7 @@
           <a:p>
             <a:fld id="{DBBD8385-818C-48A9-A8BE-462C76FE1CE1}" type="datetimeFigureOut">
               <a:rPr lang="en-GB" smtClean="0"/>
-              <a:t>19/11/2019</a:t>
+              <a:t>20/11/2019</a:t>
             </a:fld>
             <a:endParaRPr lang="en-GB"/>
           </a:p>
@@ -2948,7 +2948,7 @@
           <a:p>
             <a:fld id="{DBBD8385-818C-48A9-A8BE-462C76FE1CE1}" type="datetimeFigureOut">
               <a:rPr lang="en-GB" smtClean="0"/>
-              <a:t>19/11/2019</a:t>
+              <a:t>20/11/2019</a:t>
             </a:fld>
             <a:endParaRPr lang="en-GB"/>
           </a:p>
@@ -4350,7 +4350,7 @@
         <p:spPr>
           <a:xfrm>
             <a:off x="6786280" y="1687047"/>
-            <a:ext cx="3558989" cy="3877985"/>
+            <a:ext cx="3558989" cy="4154984"/>
           </a:xfrm>
           <a:prstGeom prst="rect">
             <a:avLst/>
@@ -4427,7 +4427,7 @@
                 <a:latin typeface="Times New Roman" panose="02020603050405020304" pitchFamily="18" charset="0"/>
                 <a:cs typeface="Times New Roman" panose="02020603050405020304" pitchFamily="18" charset="0"/>
               </a:rPr>
-              <a:t>User input checks were pushed back because of the delay in the add item to inventory functions.</a:t>
+              <a:t>User input checks were pushed back to sprint 2 due to the delay in the add item to inventory functions.</a:t>
             </a:r>
           </a:p>
           <a:p>
@@ -4456,7 +4456,7 @@
         <p:spPr>
           <a:xfrm>
             <a:off x="1846731" y="1687047"/>
-            <a:ext cx="3558989" cy="4708981"/>
+            <a:ext cx="3558989" cy="4985980"/>
           </a:xfrm>
           <a:prstGeom prst="rect">
             <a:avLst/>
@@ -4582,7 +4582,7 @@
                 <a:latin typeface="Times New Roman" panose="02020603050405020304" pitchFamily="18" charset="0"/>
                 <a:cs typeface="Times New Roman" panose="02020603050405020304" pitchFamily="18" charset="0"/>
               </a:rPr>
-              <a:t> on the items and Inventory pages.</a:t>
+              <a:t> on the items page and functionality on the shop and inventory pages.</a:t>
             </a:r>
           </a:p>
         </p:txBody>
@@ -4891,7 +4891,9 @@
         </p:nvSpPr>
         <p:spPr/>
         <p:txBody>
-          <a:bodyPr/>
+          <a:bodyPr>
+            <a:normAutofit fontScale="92500" lnSpcReduction="10000"/>
+          </a:bodyPr>
           <a:lstStyle/>
           <a:p>
             <a:pPr marL="0" indent="0">
@@ -4947,6 +4949,35 @@
                 <a:latin typeface="Times New Roman" panose="02020603050405020304" pitchFamily="18" charset="0"/>
                 <a:cs typeface="Times New Roman" panose="02020603050405020304" pitchFamily="18" charset="0"/>
               </a:rPr>
+              <a:t>Add user input validation at the same time the user input functionality is written in the front-end.</a:t>
+            </a:r>
+          </a:p>
+          <a:p>
+            <a:pPr marL="342900" indent="-342900">
+              <a:buFontTx/>
+              <a:buChar char="-"/>
+            </a:pPr>
+            <a:endParaRPr lang="en-GB" dirty="0">
+              <a:solidFill>
+                <a:srgbClr val="C00000"/>
+              </a:solidFill>
+              <a:latin typeface="Times New Roman" panose="02020603050405020304" pitchFamily="18" charset="0"/>
+              <a:cs typeface="Times New Roman" panose="02020603050405020304" pitchFamily="18" charset="0"/>
+            </a:endParaRPr>
+          </a:p>
+          <a:p>
+            <a:pPr marL="342900" indent="-342900">
+              <a:buFontTx/>
+              <a:buChar char="-"/>
+            </a:pPr>
+            <a:r>
+              <a:rPr lang="en-GB" dirty="0">
+                <a:solidFill>
+                  <a:srgbClr val="C00000"/>
+                </a:solidFill>
+                <a:latin typeface="Times New Roman" panose="02020603050405020304" pitchFamily="18" charset="0"/>
+                <a:cs typeface="Times New Roman" panose="02020603050405020304" pitchFamily="18" charset="0"/>
+              </a:rPr>
               <a:t>Delays occurred when time was spent focusing on certain aspects of the CRUD implementation through the front end. With the new familiarity of the CRUD functions using </a:t>
             </a:r>
             <a:r>
@@ -4967,7 +4998,7 @@
                 <a:latin typeface="Times New Roman" panose="02020603050405020304" pitchFamily="18" charset="0"/>
                 <a:cs typeface="Times New Roman" panose="02020603050405020304" pitchFamily="18" charset="0"/>
               </a:rPr>
-              <a:t>, these CRUD functions will be much faster to create.</a:t>
+              <a:t>, these CRUD functions would be much faster to create.</a:t>
             </a:r>
           </a:p>
           <a:p>

</xml_diff>